<commit_message>
Add insights to correlation matrix and highest positive and highest negative correlation
</commit_message>
<xml_diff>
--- a/2403_ PT_DS_Regression_Agri-food sector- Analysis.pptx
+++ b/2403_ PT_DS_Regression_Agri-food sector- Analysis.pptx
@@ -44,14 +44,14 @@
   <p:notesSz cx="6858000" cy="9144000"/>
   <p:embeddedFontLst>
     <p:embeddedFont>
-      <p:font typeface="DM Sans" pitchFamily="2" charset="77"/>
+      <p:font typeface="DM Sans" pitchFamily="2" charset="0"/>
       <p:regular r:id="rId34"/>
       <p:bold r:id="rId35"/>
       <p:italic r:id="rId36"/>
       <p:boldItalic r:id="rId37"/>
     </p:embeddedFont>
     <p:embeddedFont>
-      <p:font typeface="Outfit" pitchFamily="2" charset="0"/>
+      <p:font typeface="Outfit" panose="020B0604020202020204" charset="0"/>
       <p:regular r:id="rId38"/>
       <p:bold r:id="rId39"/>
     </p:embeddedFont>
@@ -293,12 +293,71 @@
 </p:presentation>
 </file>
 
-<file path=ppt/revisionInfo.xml><?xml version="1.0" encoding="utf-8"?>
-<p1510:revInfo xmlns:a="http://schemas.openxmlformats.org/drawingml/2006/main" xmlns:r="http://schemas.openxmlformats.org/officeDocument/2006/relationships" xmlns:p1510="http://schemas.microsoft.com/office/powerpoint/2015/10/main">
-  <p1510:revLst>
-    <p1510:client id="{24200EEF-3972-4A0D-AF1B-E7A78DA9C487}" v="13" dt="2024-11-08T15:42:27.979"/>
-  </p1510:revLst>
-</p1510:revInfo>
+<file path=ppt/changesInfos/changesInfo1.xml><?xml version="1.0" encoding="utf-8"?>
+<pc:chgInfo xmlns:a="http://schemas.openxmlformats.org/drawingml/2006/main" xmlns:r="http://schemas.openxmlformats.org/officeDocument/2006/relationships" xmlns:ac="http://schemas.microsoft.com/office/drawing/2013/main/command" xmlns:pc="http://schemas.microsoft.com/office/powerpoint/2013/main/command">
+  <pc:docChgLst>
+    <pc:chgData name="Fleur, Tim" userId="64a4c2a6-e834-4d4d-8b4d-dea56833ee72" providerId="ADAL" clId="{6D28BA15-6FBA-4D77-9377-0F592172A1F3}"/>
+    <pc:docChg chg="undo custSel modSld">
+      <pc:chgData name="Fleur, Tim" userId="64a4c2a6-e834-4d4d-8b4d-dea56833ee72" providerId="ADAL" clId="{6D28BA15-6FBA-4D77-9377-0F592172A1F3}" dt="2024-11-09T18:55:11.080" v="8" actId="21"/>
+      <pc:docMkLst>
+        <pc:docMk/>
+      </pc:docMkLst>
+      <pc:sldChg chg="modSp mod">
+        <pc:chgData name="Fleur, Tim" userId="64a4c2a6-e834-4d4d-8b4d-dea56833ee72" providerId="ADAL" clId="{6D28BA15-6FBA-4D77-9377-0F592172A1F3}" dt="2024-11-09T18:51:43.967" v="0" actId="313"/>
+        <pc:sldMkLst>
+          <pc:docMk/>
+          <pc:sldMk cId="0" sldId="268"/>
+        </pc:sldMkLst>
+        <pc:spChg chg="mod">
+          <ac:chgData name="Fleur, Tim" userId="64a4c2a6-e834-4d4d-8b4d-dea56833ee72" providerId="ADAL" clId="{6D28BA15-6FBA-4D77-9377-0F592172A1F3}" dt="2024-11-09T18:51:43.967" v="0" actId="313"/>
+          <ac:spMkLst>
+            <pc:docMk/>
+            <pc:sldMk cId="0" sldId="268"/>
+            <ac:spMk id="3" creationId="{B39862EB-0BF8-C36B-5A2B-862DDC898ACA}"/>
+          </ac:spMkLst>
+        </pc:spChg>
+      </pc:sldChg>
+      <pc:sldChg chg="modSp mod">
+        <pc:chgData name="Fleur, Tim" userId="64a4c2a6-e834-4d4d-8b4d-dea56833ee72" providerId="ADAL" clId="{6D28BA15-6FBA-4D77-9377-0F592172A1F3}" dt="2024-11-09T18:53:03.997" v="2" actId="20577"/>
+        <pc:sldMkLst>
+          <pc:docMk/>
+          <pc:sldMk cId="2114265551" sldId="312"/>
+        </pc:sldMkLst>
+        <pc:spChg chg="mod">
+          <ac:chgData name="Fleur, Tim" userId="64a4c2a6-e834-4d4d-8b4d-dea56833ee72" providerId="ADAL" clId="{6D28BA15-6FBA-4D77-9377-0F592172A1F3}" dt="2024-11-09T18:53:03.997" v="2" actId="20577"/>
+          <ac:spMkLst>
+            <pc:docMk/>
+            <pc:sldMk cId="2114265551" sldId="312"/>
+            <ac:spMk id="431" creationId="{00000000-0000-0000-0000-000000000000}"/>
+          </ac:spMkLst>
+        </pc:spChg>
+      </pc:sldChg>
+      <pc:sldChg chg="addSp delSp modSp mod">
+        <pc:chgData name="Fleur, Tim" userId="64a4c2a6-e834-4d4d-8b4d-dea56833ee72" providerId="ADAL" clId="{6D28BA15-6FBA-4D77-9377-0F592172A1F3}" dt="2024-11-09T18:55:11.080" v="8" actId="21"/>
+        <pc:sldMkLst>
+          <pc:docMk/>
+          <pc:sldMk cId="4265896588" sldId="314"/>
+        </pc:sldMkLst>
+        <pc:spChg chg="add del mod">
+          <ac:chgData name="Fleur, Tim" userId="64a4c2a6-e834-4d4d-8b4d-dea56833ee72" providerId="ADAL" clId="{6D28BA15-6FBA-4D77-9377-0F592172A1F3}" dt="2024-11-09T18:55:11.080" v="8" actId="21"/>
+          <ac:spMkLst>
+            <pc:docMk/>
+            <pc:sldMk cId="4265896588" sldId="314"/>
+            <ac:spMk id="3" creationId="{632F4F6A-0BFB-7838-9288-C8937D96038A}"/>
+          </ac:spMkLst>
+        </pc:spChg>
+        <pc:spChg chg="del">
+          <ac:chgData name="Fleur, Tim" userId="64a4c2a6-e834-4d4d-8b4d-dea56833ee72" providerId="ADAL" clId="{6D28BA15-6FBA-4D77-9377-0F592172A1F3}" dt="2024-11-09T18:54:10.848" v="3" actId="21"/>
+          <ac:spMkLst>
+            <pc:docMk/>
+            <pc:sldMk cId="4265896588" sldId="314"/>
+            <ac:spMk id="431" creationId="{00000000-0000-0000-0000-000000000000}"/>
+          </ac:spMkLst>
+        </pc:spChg>
+      </pc:sldChg>
+    </pc:docChg>
+  </pc:docChgLst>
+</pc:chgInfo>
 </file>
 
 <file path=ppt/diagrams/colors1.xml><?xml version="1.0" encoding="utf-8"?>
@@ -2302,13 +2361,13 @@
     <dgm:cxn modelId="{3F8C8F30-D7CC-C74F-9D2A-07AD86DF8B85}" type="presOf" srcId="{437A5015-73C9-D845-ABB0-28C8FD1EC00F}" destId="{078132EC-97C6-B64E-89D5-260A324B0261}" srcOrd="0" destOrd="0" presId="urn:microsoft.com/office/officeart/2005/8/layout/process3"/>
     <dgm:cxn modelId="{5B94AB37-CD8D-0246-8930-AB5D9E68D9E5}" type="presOf" srcId="{83A3FC17-0167-5C41-A127-5D11DC86477A}" destId="{B4B9F4D3-41E7-F449-94B4-6DD3E162A6FA}" srcOrd="0" destOrd="0" presId="urn:microsoft.com/office/officeart/2005/8/layout/process3"/>
     <dgm:cxn modelId="{D0195A40-59F4-8540-9C1A-6D2A715B6AB7}" srcId="{9351157C-4DB1-C949-8564-830E02ADCE81}" destId="{51960B64-805C-5C4A-9FF3-2E8DB9B0D111}" srcOrd="0" destOrd="0" parTransId="{F5C22858-52F6-3147-9137-7D67CC7DE4C7}" sibTransId="{85574CB4-599B-0340-BB2F-ACAF5DAB6F22}"/>
-    <dgm:cxn modelId="{2EF9DD4D-A2B6-1343-9DC2-F32452042ABF}" type="presOf" srcId="{578F313B-0A89-FF44-AB4A-CEE17B646418}" destId="{0B42D827-D878-3447-841B-133DDA1E5DA9}" srcOrd="1" destOrd="0" presId="urn:microsoft.com/office/officeart/2005/8/layout/process3"/>
-    <dgm:cxn modelId="{0D4DCD4E-B850-F248-906B-E510C470FA39}" srcId="{E9BC3E59-3CCB-F041-A8FB-84FB1B46B1B7}" destId="{9351157C-4DB1-C949-8564-830E02ADCE81}" srcOrd="1" destOrd="0" parTransId="{BA1F2D3C-E143-9A49-97A4-1B824FF728E0}" sibTransId="{94E412C7-C4A0-9C45-84D0-B58FD479AE5B}"/>
-    <dgm:cxn modelId="{4B5E9353-BA46-2144-9083-42B4245CF71D}" type="presOf" srcId="{578F313B-0A89-FF44-AB4A-CEE17B646418}" destId="{733EDF3D-209D-3644-8C39-642ED83ADBC4}" srcOrd="0" destOrd="0" presId="urn:microsoft.com/office/officeart/2005/8/layout/process3"/>
     <dgm:cxn modelId="{AA0D5562-AE17-1E4A-9A1F-3E600ACED9E3}" srcId="{E9BC3E59-3CCB-F041-A8FB-84FB1B46B1B7}" destId="{437A5015-73C9-D845-ABB0-28C8FD1EC00F}" srcOrd="0" destOrd="0" parTransId="{70732F20-8B65-B04F-995E-E98EB911A699}" sibTransId="{80386781-6967-CD44-AC4E-EAFE4B6BB796}"/>
     <dgm:cxn modelId="{E4D8A36C-1247-F947-862B-A21EFE810F05}" srcId="{437A5015-73C9-D845-ABB0-28C8FD1EC00F}" destId="{83A3FC17-0167-5C41-A127-5D11DC86477A}" srcOrd="0" destOrd="0" parTransId="{F0B2C800-DBC5-584E-B139-CB2D5D87C243}" sibTransId="{EB00F86E-F0E5-D440-A3B5-3666392E1FD1}"/>
     <dgm:cxn modelId="{BC65026D-C62A-744A-8077-B29F6E29BBA0}" type="presOf" srcId="{9351157C-4DB1-C949-8564-830E02ADCE81}" destId="{21BF6659-A766-984F-8B5F-EABF3AA584DF}" srcOrd="0" destOrd="0" presId="urn:microsoft.com/office/officeart/2005/8/layout/process3"/>
+    <dgm:cxn modelId="{2EF9DD4D-A2B6-1343-9DC2-F32452042ABF}" type="presOf" srcId="{578F313B-0A89-FF44-AB4A-CEE17B646418}" destId="{0B42D827-D878-3447-841B-133DDA1E5DA9}" srcOrd="1" destOrd="0" presId="urn:microsoft.com/office/officeart/2005/8/layout/process3"/>
+    <dgm:cxn modelId="{0D4DCD4E-B850-F248-906B-E510C470FA39}" srcId="{E9BC3E59-3CCB-F041-A8FB-84FB1B46B1B7}" destId="{9351157C-4DB1-C949-8564-830E02ADCE81}" srcOrd="1" destOrd="0" parTransId="{BA1F2D3C-E143-9A49-97A4-1B824FF728E0}" sibTransId="{94E412C7-C4A0-9C45-84D0-B58FD479AE5B}"/>
     <dgm:cxn modelId="{2A449772-30BC-6F4D-9EDE-AF8F870C5DA7}" type="presOf" srcId="{67B6364D-AA5B-904C-9AE9-32BA30AE9CEC}" destId="{9F46AA0C-A86C-2047-B4F1-C516E85B40AE}" srcOrd="1" destOrd="0" presId="urn:microsoft.com/office/officeart/2005/8/layout/process3"/>
+    <dgm:cxn modelId="{4B5E9353-BA46-2144-9083-42B4245CF71D}" type="presOf" srcId="{578F313B-0A89-FF44-AB4A-CEE17B646418}" destId="{733EDF3D-209D-3644-8C39-642ED83ADBC4}" srcOrd="0" destOrd="0" presId="urn:microsoft.com/office/officeart/2005/8/layout/process3"/>
     <dgm:cxn modelId="{C784EE74-A6CD-3945-8C6F-4BA4F7A4D66F}" srcId="{E9BC3E59-3CCB-F041-A8FB-84FB1B46B1B7}" destId="{67B6364D-AA5B-904C-9AE9-32BA30AE9CEC}" srcOrd="3" destOrd="0" parTransId="{49849A4B-0913-BB4A-B44C-9B84BD663B87}" sibTransId="{5AB9BEA1-0492-8941-B36F-7359FF9F62D0}"/>
     <dgm:cxn modelId="{128C627B-F321-CF4F-9281-28B303C9FC35}" type="presOf" srcId="{437A5015-73C9-D845-ABB0-28C8FD1EC00F}" destId="{788B8747-514D-EC48-8684-FB8C3B14B221}" srcOrd="1" destOrd="0" presId="urn:microsoft.com/office/officeart/2005/8/layout/process3"/>
     <dgm:cxn modelId="{91FC2B89-01CE-9143-8CC8-B4E4A636A2B5}" type="presOf" srcId="{94E412C7-C4A0-9C45-84D0-B58FD479AE5B}" destId="{52F940A6-A444-3143-A180-372F626EAB00}" srcOrd="0" destOrd="0" presId="urn:microsoft.com/office/officeart/2005/8/layout/process3"/>
@@ -28080,12 +28139,8 @@
               <a:buNone/>
             </a:pPr>
             <a:r>
-              <a:rPr lang="en" dirty="0" err="1"/>
-              <a:t>Visualisation</a:t>
-            </a:r>
-            <a:r>
               <a:rPr lang="en" dirty="0"/>
-              <a:t> of models used in EDA</a:t>
+              <a:t>Vizualisation of models used in EDA</a:t>
             </a:r>
             <a:endParaRPr dirty="0"/>
           </a:p>
@@ -31975,10 +32030,10 @@
               <a:buNone/>
             </a:pPr>
             <a:r>
-              <a:rPr lang="en"/>
+              <a:rPr lang="en" dirty="0"/>
               <a:t>You can enter a subtitle here if you need it</a:t>
             </a:r>
-            <a:endParaRPr/>
+            <a:endParaRPr dirty="0"/>
           </a:p>
         </p:txBody>
       </p:sp>
@@ -35770,48 +35825,6 @@
           </a:p>
         </p:txBody>
       </p:sp>
-      <p:sp>
-        <p:nvSpPr>
-          <p:cNvPr id="431" name="Google Shape;431;p40"/>
-          <p:cNvSpPr txBox="1">
-            <a:spLocks noGrp="1"/>
-          </p:cNvSpPr>
-          <p:nvPr>
-            <p:ph type="subTitle" idx="1"/>
-          </p:nvPr>
-        </p:nvSpPr>
-        <p:spPr>
-          <a:xfrm>
-            <a:off x="713225" y="3300150"/>
-            <a:ext cx="4344300" cy="375000"/>
-          </a:xfrm>
-          <a:prstGeom prst="rect">
-            <a:avLst/>
-          </a:prstGeom>
-        </p:spPr>
-        <p:txBody>
-          <a:bodyPr spcFirstLastPara="1" wrap="square" lIns="91425" tIns="91425" rIns="91425" bIns="91425" anchor="t" anchorCtr="0">
-            <a:noAutofit/>
-          </a:bodyPr>
-          <a:lstStyle/>
-          <a:p>
-            <a:pPr marL="0" lvl="0" indent="0" algn="l" rtl="0">
-              <a:spcBef>
-                <a:spcPts val="0"/>
-              </a:spcBef>
-              <a:spcAft>
-                <a:spcPts val="0"/>
-              </a:spcAft>
-              <a:buNone/>
-            </a:pPr>
-            <a:r>
-              <a:rPr lang="en" dirty="0"/>
-              <a:t>You can enter a subtitle here if you need it</a:t>
-            </a:r>
-            <a:endParaRPr dirty="0"/>
-          </a:p>
-        </p:txBody>
-      </p:sp>
       <p:grpSp>
         <p:nvGrpSpPr>
           <p:cNvPr id="432" name="Google Shape;432;p40"/>
@@ -37161,6 +37174,36 @@
           </a:ln>
         </p:spPr>
       </p:cxnSp>
+      <p:sp>
+        <p:nvSpPr>
+          <p:cNvPr id="3" name="Subtitle 2">
+            <a:extLst>
+              <a:ext uri="{FF2B5EF4-FFF2-40B4-BE49-F238E27FC236}">
+                <a16:creationId xmlns:a16="http://schemas.microsoft.com/office/drawing/2014/main" id="{632F4F6A-0BFB-7838-9288-C8937D96038A}"/>
+              </a:ext>
+            </a:extLst>
+          </p:cNvPr>
+          <p:cNvSpPr>
+            <a:spLocks noGrp="1"/>
+          </p:cNvSpPr>
+          <p:nvPr>
+            <p:ph type="subTitle" idx="1"/>
+          </p:nvPr>
+        </p:nvSpPr>
+        <p:spPr>
+          <a:xfrm>
+            <a:off x="713225" y="3327990"/>
+            <a:ext cx="4344300" cy="375000"/>
+          </a:xfrm>
+        </p:spPr>
+        <p:txBody>
+          <a:bodyPr/>
+          <a:lstStyle/>
+          <a:p>
+            <a:endParaRPr lang="en-US" dirty="0"/>
+          </a:p>
+        </p:txBody>
+      </p:sp>
     </p:spTree>
     <p:extLst>
       <p:ext uri="{BB962C8B-B14F-4D97-AF65-F5344CB8AC3E}">
@@ -39433,12 +39476,8 @@
               <a:buNone/>
             </a:pPr>
             <a:r>
-              <a:rPr lang="en-ZA" sz="1800" dirty="0" err="1"/>
-              <a:t>Analyze</a:t>
-            </a:r>
-            <a:r>
               <a:rPr lang="en-ZA" sz="1800" dirty="0"/>
-              <a:t> FAO and IPCC data on GHG emissions from the agri-food sector to understand its impact and develop climate change mitigation strategies.</a:t>
+              <a:t>Analyse FAO and IPCC data on GHG emissions from the agri-food sector to understand its impact and develop climate change mitigation strategies.</a:t>
             </a:r>
           </a:p>
         </p:txBody>

</xml_diff>

<commit_message>
Tidy notebook and final insights, align readme.md, add requirements.txt, update prezzo
</commit_message>
<xml_diff>
--- a/2403_ PT_DS_Regression_Agri-food sector- Analysis.pptx
+++ b/2403_ PT_DS_Regression_Agri-food sector- Analysis.pptx
@@ -48,14 +48,14 @@
   <p:notesSz cx="6858000" cy="9144000"/>
   <p:embeddedFontLst>
     <p:embeddedFont>
-      <p:font typeface="DM Sans" pitchFamily="2" charset="77"/>
+      <p:font typeface="DM Sans" pitchFamily="2" charset="0"/>
       <p:regular r:id="rId38"/>
       <p:bold r:id="rId39"/>
       <p:italic r:id="rId40"/>
       <p:boldItalic r:id="rId41"/>
     </p:embeddedFont>
     <p:embeddedFont>
-      <p:font typeface="Outfit" pitchFamily="2" charset="0"/>
+      <p:font typeface="Outfit" panose="020B0604020202020204" charset="0"/>
       <p:regular r:id="rId42"/>
       <p:bold r:id="rId43"/>
     </p:embeddedFont>
@@ -295,6 +295,14 @@
     </p:ext>
   </p:extLst>
 </p:presentation>
+</file>
+
+<file path=ppt/revisionInfo.xml><?xml version="1.0" encoding="utf-8"?>
+<p1510:revInfo xmlns:a="http://schemas.openxmlformats.org/drawingml/2006/main" xmlns:r="http://schemas.openxmlformats.org/officeDocument/2006/relationships" xmlns:p1510="http://schemas.microsoft.com/office/powerpoint/2015/10/main">
+  <p1510:revLst>
+    <p1510:client id="{E7299E4C-110B-41F2-B016-ACE162FFD2CF}" v="1" dt="2024-11-11T07:11:25.457"/>
+  </p1510:revLst>
+</p1510:revInfo>
 </file>
 
 <file path=ppt/changesInfos/changesInfo1.xml><?xml version="1.0" encoding="utf-8"?>
@@ -3100,13 +3108,13 @@
     <dgm:cxn modelId="{3F8C8F30-D7CC-C74F-9D2A-07AD86DF8B85}" type="presOf" srcId="{437A5015-73C9-D845-ABB0-28C8FD1EC00F}" destId="{078132EC-97C6-B64E-89D5-260A324B0261}" srcOrd="0" destOrd="0" presId="urn:microsoft.com/office/officeart/2005/8/layout/process3"/>
     <dgm:cxn modelId="{5B94AB37-CD8D-0246-8930-AB5D9E68D9E5}" type="presOf" srcId="{83A3FC17-0167-5C41-A127-5D11DC86477A}" destId="{B4B9F4D3-41E7-F449-94B4-6DD3E162A6FA}" srcOrd="0" destOrd="0" presId="urn:microsoft.com/office/officeart/2005/8/layout/process3"/>
     <dgm:cxn modelId="{D0195A40-59F4-8540-9C1A-6D2A715B6AB7}" srcId="{9351157C-4DB1-C949-8564-830E02ADCE81}" destId="{51960B64-805C-5C4A-9FF3-2E8DB9B0D111}" srcOrd="0" destOrd="0" parTransId="{F5C22858-52F6-3147-9137-7D67CC7DE4C7}" sibTransId="{85574CB4-599B-0340-BB2F-ACAF5DAB6F22}"/>
-    <dgm:cxn modelId="{2EF9DD4D-A2B6-1343-9DC2-F32452042ABF}" type="presOf" srcId="{578F313B-0A89-FF44-AB4A-CEE17B646418}" destId="{0B42D827-D878-3447-841B-133DDA1E5DA9}" srcOrd="1" destOrd="0" presId="urn:microsoft.com/office/officeart/2005/8/layout/process3"/>
-    <dgm:cxn modelId="{0D4DCD4E-B850-F248-906B-E510C470FA39}" srcId="{E9BC3E59-3CCB-F041-A8FB-84FB1B46B1B7}" destId="{9351157C-4DB1-C949-8564-830E02ADCE81}" srcOrd="1" destOrd="0" parTransId="{BA1F2D3C-E143-9A49-97A4-1B824FF728E0}" sibTransId="{94E412C7-C4A0-9C45-84D0-B58FD479AE5B}"/>
-    <dgm:cxn modelId="{4B5E9353-BA46-2144-9083-42B4245CF71D}" type="presOf" srcId="{578F313B-0A89-FF44-AB4A-CEE17B646418}" destId="{733EDF3D-209D-3644-8C39-642ED83ADBC4}" srcOrd="0" destOrd="0" presId="urn:microsoft.com/office/officeart/2005/8/layout/process3"/>
     <dgm:cxn modelId="{AA0D5562-AE17-1E4A-9A1F-3E600ACED9E3}" srcId="{E9BC3E59-3CCB-F041-A8FB-84FB1B46B1B7}" destId="{437A5015-73C9-D845-ABB0-28C8FD1EC00F}" srcOrd="0" destOrd="0" parTransId="{70732F20-8B65-B04F-995E-E98EB911A699}" sibTransId="{80386781-6967-CD44-AC4E-EAFE4B6BB796}"/>
     <dgm:cxn modelId="{E4D8A36C-1247-F947-862B-A21EFE810F05}" srcId="{437A5015-73C9-D845-ABB0-28C8FD1EC00F}" destId="{83A3FC17-0167-5C41-A127-5D11DC86477A}" srcOrd="0" destOrd="0" parTransId="{F0B2C800-DBC5-584E-B139-CB2D5D87C243}" sibTransId="{EB00F86E-F0E5-D440-A3B5-3666392E1FD1}"/>
     <dgm:cxn modelId="{BC65026D-C62A-744A-8077-B29F6E29BBA0}" type="presOf" srcId="{9351157C-4DB1-C949-8564-830E02ADCE81}" destId="{21BF6659-A766-984F-8B5F-EABF3AA584DF}" srcOrd="0" destOrd="0" presId="urn:microsoft.com/office/officeart/2005/8/layout/process3"/>
+    <dgm:cxn modelId="{2EF9DD4D-A2B6-1343-9DC2-F32452042ABF}" type="presOf" srcId="{578F313B-0A89-FF44-AB4A-CEE17B646418}" destId="{0B42D827-D878-3447-841B-133DDA1E5DA9}" srcOrd="1" destOrd="0" presId="urn:microsoft.com/office/officeart/2005/8/layout/process3"/>
+    <dgm:cxn modelId="{0D4DCD4E-B850-F248-906B-E510C470FA39}" srcId="{E9BC3E59-3CCB-F041-A8FB-84FB1B46B1B7}" destId="{9351157C-4DB1-C949-8564-830E02ADCE81}" srcOrd="1" destOrd="0" parTransId="{BA1F2D3C-E143-9A49-97A4-1B824FF728E0}" sibTransId="{94E412C7-C4A0-9C45-84D0-B58FD479AE5B}"/>
     <dgm:cxn modelId="{2A449772-30BC-6F4D-9EDE-AF8F870C5DA7}" type="presOf" srcId="{67B6364D-AA5B-904C-9AE9-32BA30AE9CEC}" destId="{9F46AA0C-A86C-2047-B4F1-C516E85B40AE}" srcOrd="1" destOrd="0" presId="urn:microsoft.com/office/officeart/2005/8/layout/process3"/>
+    <dgm:cxn modelId="{4B5E9353-BA46-2144-9083-42B4245CF71D}" type="presOf" srcId="{578F313B-0A89-FF44-AB4A-CEE17B646418}" destId="{733EDF3D-209D-3644-8C39-642ED83ADBC4}" srcOrd="0" destOrd="0" presId="urn:microsoft.com/office/officeart/2005/8/layout/process3"/>
     <dgm:cxn modelId="{C784EE74-A6CD-3945-8C6F-4BA4F7A4D66F}" srcId="{E9BC3E59-3CCB-F041-A8FB-84FB1B46B1B7}" destId="{67B6364D-AA5B-904C-9AE9-32BA30AE9CEC}" srcOrd="3" destOrd="0" parTransId="{49849A4B-0913-BB4A-B44C-9B84BD663B87}" sibTransId="{5AB9BEA1-0492-8941-B36F-7359FF9F62D0}"/>
     <dgm:cxn modelId="{128C627B-F321-CF4F-9281-28B303C9FC35}" type="presOf" srcId="{437A5015-73C9-D845-ABB0-28C8FD1EC00F}" destId="{788B8747-514D-EC48-8684-FB8C3B14B221}" srcOrd="1" destOrd="0" presId="urn:microsoft.com/office/officeart/2005/8/layout/process3"/>
     <dgm:cxn modelId="{91FC2B89-01CE-9143-8CC8-B4E4A636A2B5}" type="presOf" srcId="{94E412C7-C4A0-9C45-84D0-B58FD479AE5B}" destId="{52F940A6-A444-3143-A180-372F626EAB00}" srcOrd="0" destOrd="0" presId="urn:microsoft.com/office/officeart/2005/8/layout/process3"/>
@@ -3982,8 +3990,8 @@
     <dgm:cxn modelId="{944DE316-5800-804C-ACBD-887749F0F4AA}" srcId="{A54C763C-2379-FB4B-B2ED-C4526A901BD6}" destId="{FC42F17E-291E-3A4A-8BE8-87C81DBC65AD}" srcOrd="4" destOrd="0" parTransId="{A08D9104-BE7E-6A41-8E36-F89D2A33812E}" sibTransId="{25E8815E-5C5E-6C44-86FA-6008B8BC8066}"/>
     <dgm:cxn modelId="{6DBBDD2E-DC93-AF46-A34B-FA516ABBEA3F}" srcId="{A54C763C-2379-FB4B-B2ED-C4526A901BD6}" destId="{EE4D3A4D-A5E3-4443-9906-F840FECA465B}" srcOrd="0" destOrd="0" parTransId="{59D39278-DD06-5C40-B367-F97FFECF283E}" sibTransId="{B06EF2F4-5286-0643-AE93-4D06242FCEEE}"/>
     <dgm:cxn modelId="{857C4A39-9D0F-B740-A521-C413E4F1900C}" type="presOf" srcId="{EE4D3A4D-A5E3-4443-9906-F840FECA465B}" destId="{719807B2-EFFA-2E46-9E98-16E73ECE582A}" srcOrd="0" destOrd="0" presId="urn:microsoft.com/office/officeart/2008/layout/LinedList"/>
+    <dgm:cxn modelId="{1878F95E-69D5-7041-8179-1FA858EB298D}" type="presOf" srcId="{6C1B7D47-F3AE-4C43-94DD-F6FC3BDFDAF3}" destId="{A30427EF-7266-B74F-91A4-162A865A0E1B}" srcOrd="0" destOrd="0" presId="urn:microsoft.com/office/officeart/2008/layout/LinedList"/>
     <dgm:cxn modelId="{0A682D50-0B02-5D4E-AE41-58711BEC3832}" type="presOf" srcId="{8BE61237-534C-2443-A37E-8A79A3ECBDEE}" destId="{19C54B45-6A8D-CE40-9D98-E748D5A29C67}" srcOrd="0" destOrd="0" presId="urn:microsoft.com/office/officeart/2008/layout/LinedList"/>
-    <dgm:cxn modelId="{1878F95E-69D5-7041-8179-1FA858EB298D}" type="presOf" srcId="{6C1B7D47-F3AE-4C43-94DD-F6FC3BDFDAF3}" destId="{A30427EF-7266-B74F-91A4-162A865A0E1B}" srcOrd="0" destOrd="0" presId="urn:microsoft.com/office/officeart/2008/layout/LinedList"/>
     <dgm:cxn modelId="{F3B87C8F-8624-B442-8FCC-DE8D7C2F02FB}" srcId="{A54C763C-2379-FB4B-B2ED-C4526A901BD6}" destId="{8BE61237-534C-2443-A37E-8A79A3ECBDEE}" srcOrd="3" destOrd="0" parTransId="{6C69380D-F0DE-684B-BAFD-FB72F46E17E3}" sibTransId="{E8B9F88B-A2BE-E640-A3D4-A5A5FF1BB2A3}"/>
     <dgm:cxn modelId="{0F718796-F755-EE46-8981-90B275B2B2B2}" type="presOf" srcId="{A54C763C-2379-FB4B-B2ED-C4526A901BD6}" destId="{B1A13607-EBA0-4C41-815F-D5051EACF3A9}" srcOrd="0" destOrd="0" presId="urn:microsoft.com/office/officeart/2008/layout/LinedList"/>
     <dgm:cxn modelId="{DB5725B7-DCAF-6147-9CD4-D4EBB70C55CC}" srcId="{A54C763C-2379-FB4B-B2ED-C4526A901BD6}" destId="{CF09D936-AC4E-C448-ACE1-BEC4738BEFC6}" srcOrd="5" destOrd="0" parTransId="{642E673C-BD81-1C49-8D9D-DA7E4DE62280}" sibTransId="{6A28A422-7785-9C47-80EE-C7718ADEBBE3}"/>
@@ -25835,7 +25843,7 @@
               <a:t>Explor</a:t>
             </a:r>
             <a:r>
-              <a:rPr lang="en-ZA" dirty="0" err="1"/>
+              <a:rPr lang="en-ZA" dirty="0"/>
               <a:t>atory</a:t>
             </a:r>
             <a:r>

</xml_diff>